<commit_message>
Artefatos do 15 ao 22
</commit_message>
<xml_diff>
--- a/15 - Arquitetura de Negócio para cada Cenário.pptx
+++ b/15 - Arquitetura de Negócio para cada Cenário.pptx
@@ -5,13 +5,10 @@
     <p:sldMasterId id="2147483648" r:id="rId1"/>
   </p:sldMasterIdLst>
   <p:sldIdLst>
-    <p:sldId id="256" r:id="rId2"/>
-    <p:sldId id="264" r:id="rId3"/>
-    <p:sldId id="257" r:id="rId4"/>
-    <p:sldId id="258" r:id="rId5"/>
-    <p:sldId id="263" r:id="rId6"/>
-    <p:sldId id="259" r:id="rId7"/>
-    <p:sldId id="265" r:id="rId8"/>
+    <p:sldId id="257" r:id="rId2"/>
+    <p:sldId id="258" r:id="rId3"/>
+    <p:sldId id="263" r:id="rId4"/>
+    <p:sldId id="259" r:id="rId5"/>
   </p:sldIdLst>
   <p:sldSz cx="12192000" cy="6858000"/>
   <p:notesSz cx="6858000" cy="9144000"/>
@@ -249,7 +246,7 @@
           <a:p>
             <a:fld id="{D899028E-A652-4116-A816-6EFB56C51CFD}" type="datetimeFigureOut">
               <a:rPr lang="pt-BR" smtClean="0"/>
-              <a:t>04/09/2020</a:t>
+              <a:t>16/09/2020</a:t>
             </a:fld>
             <a:endParaRPr lang="pt-BR"/>
           </a:p>
@@ -419,7 +416,7 @@
           <a:p>
             <a:fld id="{D899028E-A652-4116-A816-6EFB56C51CFD}" type="datetimeFigureOut">
               <a:rPr lang="pt-BR" smtClean="0"/>
-              <a:t>04/09/2020</a:t>
+              <a:t>16/09/2020</a:t>
             </a:fld>
             <a:endParaRPr lang="pt-BR"/>
           </a:p>
@@ -599,7 +596,7 @@
           <a:p>
             <a:fld id="{D899028E-A652-4116-A816-6EFB56C51CFD}" type="datetimeFigureOut">
               <a:rPr lang="pt-BR" smtClean="0"/>
-              <a:t>04/09/2020</a:t>
+              <a:t>16/09/2020</a:t>
             </a:fld>
             <a:endParaRPr lang="pt-BR"/>
           </a:p>
@@ -769,7 +766,7 @@
           <a:p>
             <a:fld id="{D899028E-A652-4116-A816-6EFB56C51CFD}" type="datetimeFigureOut">
               <a:rPr lang="pt-BR" smtClean="0"/>
-              <a:t>04/09/2020</a:t>
+              <a:t>16/09/2020</a:t>
             </a:fld>
             <a:endParaRPr lang="pt-BR"/>
           </a:p>
@@ -1015,7 +1012,7 @@
           <a:p>
             <a:fld id="{D899028E-A652-4116-A816-6EFB56C51CFD}" type="datetimeFigureOut">
               <a:rPr lang="pt-BR" smtClean="0"/>
-              <a:t>04/09/2020</a:t>
+              <a:t>16/09/2020</a:t>
             </a:fld>
             <a:endParaRPr lang="pt-BR"/>
           </a:p>
@@ -1247,7 +1244,7 @@
           <a:p>
             <a:fld id="{D899028E-A652-4116-A816-6EFB56C51CFD}" type="datetimeFigureOut">
               <a:rPr lang="pt-BR" smtClean="0"/>
-              <a:t>04/09/2020</a:t>
+              <a:t>16/09/2020</a:t>
             </a:fld>
             <a:endParaRPr lang="pt-BR"/>
           </a:p>
@@ -1614,7 +1611,7 @@
           <a:p>
             <a:fld id="{D899028E-A652-4116-A816-6EFB56C51CFD}" type="datetimeFigureOut">
               <a:rPr lang="pt-BR" smtClean="0"/>
-              <a:t>04/09/2020</a:t>
+              <a:t>16/09/2020</a:t>
             </a:fld>
             <a:endParaRPr lang="pt-BR"/>
           </a:p>
@@ -1732,7 +1729,7 @@
           <a:p>
             <a:fld id="{D899028E-A652-4116-A816-6EFB56C51CFD}" type="datetimeFigureOut">
               <a:rPr lang="pt-BR" smtClean="0"/>
-              <a:t>04/09/2020</a:t>
+              <a:t>16/09/2020</a:t>
             </a:fld>
             <a:endParaRPr lang="pt-BR"/>
           </a:p>
@@ -1827,7 +1824,7 @@
           <a:p>
             <a:fld id="{D899028E-A652-4116-A816-6EFB56C51CFD}" type="datetimeFigureOut">
               <a:rPr lang="pt-BR" smtClean="0"/>
-              <a:t>04/09/2020</a:t>
+              <a:t>16/09/2020</a:t>
             </a:fld>
             <a:endParaRPr lang="pt-BR"/>
           </a:p>
@@ -2104,7 +2101,7 @@
           <a:p>
             <a:fld id="{D899028E-A652-4116-A816-6EFB56C51CFD}" type="datetimeFigureOut">
               <a:rPr lang="pt-BR" smtClean="0"/>
-              <a:t>04/09/2020</a:t>
+              <a:t>16/09/2020</a:t>
             </a:fld>
             <a:endParaRPr lang="pt-BR"/>
           </a:p>
@@ -2357,7 +2354,7 @@
           <a:p>
             <a:fld id="{D899028E-A652-4116-A816-6EFB56C51CFD}" type="datetimeFigureOut">
               <a:rPr lang="pt-BR" smtClean="0"/>
-              <a:t>04/09/2020</a:t>
+              <a:t>16/09/2020</a:t>
             </a:fld>
             <a:endParaRPr lang="pt-BR"/>
           </a:p>
@@ -2570,7 +2567,7 @@
           <a:p>
             <a:fld id="{D899028E-A652-4116-A816-6EFB56C51CFD}" type="datetimeFigureOut">
               <a:rPr lang="pt-BR" smtClean="0"/>
-              <a:t>04/09/2020</a:t>
+              <a:t>16/09/2020</a:t>
             </a:fld>
             <a:endParaRPr lang="pt-BR"/>
           </a:p>
@@ -2982,331 +2979,6 @@
             <a:spLocks noGrp="1"/>
           </p:cNvSpPr>
           <p:nvPr>
-            <p:ph type="ctrTitle"/>
-          </p:nvPr>
-        </p:nvSpPr>
-        <p:spPr>
-          <a:xfrm>
-            <a:off x="1524000" y="1122363"/>
-            <a:ext cx="9144000" cy="1231093"/>
-          </a:xfrm>
-        </p:spPr>
-        <p:txBody>
-          <a:bodyPr/>
-          <a:lstStyle/>
-          <a:p>
-            <a:r>
-              <a:rPr lang="pt-BR" dirty="0">
-                <a:latin typeface="Arial" panose="020B0604020202020204" pitchFamily="34" charset="0"/>
-                <a:cs typeface="Arial" panose="020B0604020202020204" pitchFamily="34" charset="0"/>
-              </a:rPr>
-              <a:t>Contexto</a:t>
-            </a:r>
-            <a:r>
-              <a:rPr lang="pt-BR" dirty="0"/>
-              <a:t> </a:t>
-            </a:r>
-            <a:r>
-              <a:rPr lang="pt-BR" dirty="0">
-                <a:latin typeface="Arial" panose="020B0604020202020204" pitchFamily="34" charset="0"/>
-                <a:cs typeface="Arial" panose="020B0604020202020204" pitchFamily="34" charset="0"/>
-              </a:rPr>
-              <a:t>de Negócio</a:t>
-            </a:r>
-          </a:p>
-        </p:txBody>
-      </p:sp>
-      <p:sp>
-        <p:nvSpPr>
-          <p:cNvPr id="3" name="Subtítulo 2"/>
-          <p:cNvSpPr>
-            <a:spLocks noGrp="1"/>
-          </p:cNvSpPr>
-          <p:nvPr>
-            <p:ph type="subTitle" idx="1"/>
-          </p:nvPr>
-        </p:nvSpPr>
-        <p:spPr/>
-        <p:txBody>
-          <a:bodyPr/>
-          <a:lstStyle/>
-          <a:p>
-            <a:r>
-              <a:rPr lang="pt-BR" sz="2800" dirty="0" err="1">
-                <a:latin typeface="Arial" panose="020B0604020202020204" pitchFamily="34" charset="0"/>
-                <a:cs typeface="Arial" panose="020B0604020202020204" pitchFamily="34" charset="0"/>
-              </a:rPr>
-              <a:t>JFM</a:t>
-            </a:r>
-            <a:r>
-              <a:rPr lang="pt-BR" sz="2800" dirty="0">
-                <a:latin typeface="Arial" panose="020B0604020202020204" pitchFamily="34" charset="0"/>
-                <a:cs typeface="Arial" panose="020B0604020202020204" pitchFamily="34" charset="0"/>
-              </a:rPr>
-              <a:t> Tech </a:t>
-            </a:r>
-            <a:r>
-              <a:rPr lang="pt-BR" sz="2800" dirty="0" err="1">
-                <a:latin typeface="Arial" panose="020B0604020202020204" pitchFamily="34" charset="0"/>
-                <a:cs typeface="Arial" panose="020B0604020202020204" pitchFamily="34" charset="0"/>
-              </a:rPr>
-              <a:t>Solutions</a:t>
-            </a:r>
-            <a:r>
-              <a:rPr lang="pt-BR" sz="2800" dirty="0">
-                <a:latin typeface="Arial" panose="020B0604020202020204" pitchFamily="34" charset="0"/>
-                <a:cs typeface="Arial" panose="020B0604020202020204" pitchFamily="34" charset="0"/>
-              </a:rPr>
-              <a:t> -</a:t>
-            </a:r>
-            <a:r>
-              <a:rPr lang="pt-BR" sz="2800" b="1" dirty="0">
-                <a:latin typeface="Arial" panose="020B0604020202020204" pitchFamily="34" charset="0"/>
-                <a:cs typeface="Arial" panose="020B0604020202020204" pitchFamily="34" charset="0"/>
-              </a:rPr>
-              <a:t> </a:t>
-            </a:r>
-            <a:r>
-              <a:rPr lang="pt-BR" sz="2800" dirty="0">
-                <a:latin typeface="Arial" panose="020B0604020202020204" pitchFamily="34" charset="0"/>
-                <a:cs typeface="Arial" panose="020B0604020202020204" pitchFamily="34" charset="0"/>
-              </a:rPr>
-              <a:t>Oficina Automotiva Rochester</a:t>
-            </a:r>
-          </a:p>
-          <a:p>
-            <a:endParaRPr lang="pt-BR" dirty="0"/>
-          </a:p>
-        </p:txBody>
-      </p:sp>
-    </p:spTree>
-    <p:extLst>
-      <p:ext uri="{BB962C8B-B14F-4D97-AF65-F5344CB8AC3E}">
-        <p14:creationId xmlns:p14="http://schemas.microsoft.com/office/powerpoint/2010/main" val="4042803890"/>
-      </p:ext>
-    </p:extLst>
-  </p:cSld>
-  <p:clrMapOvr>
-    <a:masterClrMapping/>
-  </p:clrMapOvr>
-  <p:timing>
-    <p:tnLst>
-      <p:par>
-        <p:cTn id="1" dur="indefinite" restart="never" nodeType="tmRoot"/>
-      </p:par>
-    </p:tnLst>
-  </p:timing>
-</p:sld>
-</file>
-
-<file path=ppt/slides/slide2.xml><?xml version="1.0" encoding="utf-8"?>
-<p:sld xmlns:a="http://schemas.openxmlformats.org/drawingml/2006/main" xmlns:r="http://schemas.openxmlformats.org/officeDocument/2006/relationships" xmlns:p="http://schemas.openxmlformats.org/presentationml/2006/main">
-  <p:cSld>
-    <p:spTree>
-      <p:nvGrpSpPr>
-        <p:cNvPr id="1" name=""/>
-        <p:cNvGrpSpPr/>
-        <p:nvPr/>
-      </p:nvGrpSpPr>
-      <p:grpSpPr>
-        <a:xfrm>
-          <a:off x="0" y="0"/>
-          <a:ext cx="0" cy="0"/>
-          <a:chOff x="0" y="0"/>
-          <a:chExt cx="0" cy="0"/>
-        </a:xfrm>
-      </p:grpSpPr>
-      <p:sp>
-        <p:nvSpPr>
-          <p:cNvPr id="2" name="Título 1"/>
-          <p:cNvSpPr>
-            <a:spLocks noGrp="1"/>
-          </p:cNvSpPr>
-          <p:nvPr>
-            <p:ph type="title"/>
-          </p:nvPr>
-        </p:nvSpPr>
-        <p:spPr>
-          <a:xfrm>
-            <a:off x="838200" y="365126"/>
-            <a:ext cx="10515600" cy="983990"/>
-          </a:xfrm>
-        </p:spPr>
-        <p:txBody>
-          <a:bodyPr/>
-          <a:lstStyle/>
-          <a:p>
-            <a:r>
-              <a:rPr lang="pt-BR" dirty="0"/>
-              <a:t>Controle </a:t>
-            </a:r>
-            <a:r>
-              <a:rPr lang="pt-BR" dirty="0" smtClean="0"/>
-              <a:t>da Auto Peças</a:t>
-            </a:r>
-            <a:endParaRPr lang="pt-BR" dirty="0"/>
-          </a:p>
-        </p:txBody>
-      </p:sp>
-      <p:sp>
-        <p:nvSpPr>
-          <p:cNvPr id="3" name="Espaço Reservado para Conteúdo 2"/>
-          <p:cNvSpPr>
-            <a:spLocks noGrp="1"/>
-          </p:cNvSpPr>
-          <p:nvPr>
-            <p:ph idx="1"/>
-          </p:nvPr>
-        </p:nvSpPr>
-        <p:spPr>
-          <a:xfrm>
-            <a:off x="838200" y="1499016"/>
-            <a:ext cx="10515600" cy="4677947"/>
-          </a:xfrm>
-        </p:spPr>
-        <p:txBody>
-          <a:bodyPr>
-            <a:normAutofit lnSpcReduction="10000"/>
-          </a:bodyPr>
-          <a:lstStyle/>
-          <a:p>
-            <a:r>
-              <a:rPr lang="pt-BR" dirty="0"/>
-              <a:t>Deseja-se especificar processos para </a:t>
-            </a:r>
-            <a:r>
-              <a:rPr lang="pt-BR" dirty="0" smtClean="0"/>
-              <a:t>controlar a auto peças de uma oficina automotiva. </a:t>
-            </a:r>
-            <a:endParaRPr lang="pt-BR" dirty="0"/>
-          </a:p>
-          <a:p>
-            <a:r>
-              <a:rPr lang="pt-BR" dirty="0" smtClean="0"/>
-              <a:t>Quando um cliente entra na auto peças, o </a:t>
-            </a:r>
-            <a:r>
-              <a:rPr lang="pt-BR" dirty="0" smtClean="0"/>
-              <a:t>Atendente </a:t>
-            </a:r>
-            <a:r>
-              <a:rPr lang="pt-BR" dirty="0" smtClean="0"/>
-              <a:t>deve perguntar como ele pode ajudar o cliente, se o cliente desejar comprar alguma peça o </a:t>
-            </a:r>
-            <a:r>
-              <a:rPr lang="pt-BR" dirty="0"/>
-              <a:t>Atendente </a:t>
-            </a:r>
-            <a:r>
-              <a:rPr lang="pt-BR" dirty="0" smtClean="0"/>
-              <a:t>deve realizar a venda e emitir a nota da compra do produto para caso houver necessidade de troca do produto. </a:t>
-            </a:r>
-          </a:p>
-          <a:p>
-            <a:r>
-              <a:rPr lang="pt-BR" dirty="0" smtClean="0"/>
-              <a:t>Quando </a:t>
-            </a:r>
-            <a:r>
-              <a:rPr lang="pt-BR" dirty="0"/>
-              <a:t>o cliente estiver apenas pesquisando valores o </a:t>
-            </a:r>
-            <a:r>
-              <a:rPr lang="pt-BR" dirty="0"/>
-              <a:t>Atendente </a:t>
-            </a:r>
-            <a:r>
-              <a:rPr lang="pt-BR" dirty="0"/>
-              <a:t>deve orienta-lo da melhor forma </a:t>
-            </a:r>
-            <a:r>
-              <a:rPr lang="pt-BR" dirty="0" smtClean="0"/>
-              <a:t>possível. </a:t>
-            </a:r>
-          </a:p>
-          <a:p>
-            <a:r>
-              <a:rPr lang="pt-BR" dirty="0" smtClean="0"/>
-              <a:t>Quando </a:t>
-            </a:r>
-            <a:r>
-              <a:rPr lang="pt-BR" dirty="0"/>
-              <a:t>o cliente </a:t>
-            </a:r>
-            <a:r>
-              <a:rPr lang="pt-BR" dirty="0" smtClean="0"/>
-              <a:t>vem </a:t>
-            </a:r>
-            <a:r>
-              <a:rPr lang="pt-BR" dirty="0"/>
-              <a:t>retirar o</a:t>
-            </a:r>
-            <a:r>
-              <a:rPr lang="pt-BR" dirty="0" smtClean="0"/>
-              <a:t> produto, </a:t>
-            </a:r>
-            <a:r>
-              <a:rPr lang="pt-BR" dirty="0"/>
-              <a:t>o </a:t>
-            </a:r>
-            <a:r>
-              <a:rPr lang="pt-BR" dirty="0"/>
-              <a:t>Atendente </a:t>
-            </a:r>
-            <a:r>
-              <a:rPr lang="pt-BR" dirty="0"/>
-              <a:t>deve verificar a forma de compra do produto (se foi por telefone e se já foi pago) e fazer a entrega do produto.</a:t>
-            </a:r>
-          </a:p>
-          <a:p>
-            <a:endParaRPr lang="pt-BR" dirty="0"/>
-          </a:p>
-        </p:txBody>
-      </p:sp>
-    </p:spTree>
-    <p:extLst>
-      <p:ext uri="{BB962C8B-B14F-4D97-AF65-F5344CB8AC3E}">
-        <p14:creationId xmlns:p14="http://schemas.microsoft.com/office/powerpoint/2010/main" val="3264326099"/>
-      </p:ext>
-    </p:extLst>
-  </p:cSld>
-  <p:clrMapOvr>
-    <a:masterClrMapping/>
-  </p:clrMapOvr>
-  <p:timing>
-    <p:tnLst>
-      <p:par>
-        <p:cTn id="1" dur="indefinite" restart="never" nodeType="tmRoot"/>
-      </p:par>
-    </p:tnLst>
-  </p:timing>
-</p:sld>
-</file>
-
-<file path=ppt/slides/slide3.xml><?xml version="1.0" encoding="utf-8"?>
-<p:sld xmlns:a="http://schemas.openxmlformats.org/drawingml/2006/main" xmlns:r="http://schemas.openxmlformats.org/officeDocument/2006/relationships" xmlns:p="http://schemas.openxmlformats.org/presentationml/2006/main">
-  <p:cSld>
-    <p:spTree>
-      <p:nvGrpSpPr>
-        <p:cNvPr id="1" name=""/>
-        <p:cNvGrpSpPr/>
-        <p:nvPr/>
-      </p:nvGrpSpPr>
-      <p:grpSpPr>
-        <a:xfrm>
-          <a:off x="0" y="0"/>
-          <a:ext cx="0" cy="0"/>
-          <a:chOff x="0" y="0"/>
-          <a:chExt cx="0" cy="0"/>
-        </a:xfrm>
-      </p:grpSpPr>
-      <p:sp>
-        <p:nvSpPr>
-          <p:cNvPr id="2" name="Título 1"/>
-          <p:cNvSpPr>
-            <a:spLocks noGrp="1"/>
-          </p:cNvSpPr>
-          <p:nvPr>
             <p:ph type="title"/>
           </p:nvPr>
         </p:nvSpPr>
@@ -3359,7 +3031,7 @@
           <p:cNvPr id="4" name="Retângulo 3">
             <a:extLst>
               <a:ext uri="{FF2B5EF4-FFF2-40B4-BE49-F238E27FC236}">
-                <a16:creationId xmlns="" xmlns:a16="http://schemas.microsoft.com/office/drawing/2014/main" id="{42DFA678-D1EC-4401-81D8-17314091623C}"/>
+                <a16:creationId xmlns:a16="http://schemas.microsoft.com/office/drawing/2014/main" xmlns="" id="{42DFA678-D1EC-4401-81D8-17314091623C}"/>
               </a:ext>
             </a:extLst>
           </p:cNvPr>
@@ -3411,7 +3083,7 @@
           <p:cNvPr id="5" name="Conector: Curvo 7">
             <a:extLst>
               <a:ext uri="{FF2B5EF4-FFF2-40B4-BE49-F238E27FC236}">
-                <a16:creationId xmlns="" xmlns:a16="http://schemas.microsoft.com/office/drawing/2014/main" id="{302F42A4-9F51-40B8-8E39-D9215D175084}"/>
+                <a16:creationId xmlns:a16="http://schemas.microsoft.com/office/drawing/2014/main" xmlns="" id="{302F42A4-9F51-40B8-8E39-D9215D175084}"/>
               </a:ext>
             </a:extLst>
           </p:cNvPr>
@@ -3453,7 +3125,7 @@
           <p:cNvPr id="6" name="CaixaDeTexto 5">
             <a:extLst>
               <a:ext uri="{FF2B5EF4-FFF2-40B4-BE49-F238E27FC236}">
-                <a16:creationId xmlns="" xmlns:a16="http://schemas.microsoft.com/office/drawing/2014/main" id="{8C3E5F5E-BC14-493C-BD63-68F0C75B5CA4}"/>
+                <a16:creationId xmlns:a16="http://schemas.microsoft.com/office/drawing/2014/main" xmlns="" id="{8C3E5F5E-BC14-493C-BD63-68F0C75B5CA4}"/>
               </a:ext>
             </a:extLst>
           </p:cNvPr>
@@ -3518,7 +3190,7 @@
           <p:cNvPr id="7" name="Retângulo: Cantos Arredondados 14">
             <a:extLst>
               <a:ext uri="{FF2B5EF4-FFF2-40B4-BE49-F238E27FC236}">
-                <a16:creationId xmlns="" xmlns:a16="http://schemas.microsoft.com/office/drawing/2014/main" id="{BA56DF1E-1D8A-4721-BC25-2A5D46B6F1E8}"/>
+                <a16:creationId xmlns:a16="http://schemas.microsoft.com/office/drawing/2014/main" xmlns="" id="{BA56DF1E-1D8A-4721-BC25-2A5D46B6F1E8}"/>
               </a:ext>
             </a:extLst>
           </p:cNvPr>
@@ -3596,7 +3268,7 @@
 </p:sld>
 </file>
 
-<file path=ppt/slides/slide4.xml><?xml version="1.0" encoding="utf-8"?>
+<file path=ppt/slides/slide2.xml><?xml version="1.0" encoding="utf-8"?>
 <p:sld xmlns:a="http://schemas.openxmlformats.org/drawingml/2006/main" xmlns:r="http://schemas.openxmlformats.org/officeDocument/2006/relationships" xmlns:p="http://schemas.openxmlformats.org/presentationml/2006/main">
   <p:cSld>
     <p:spTree>
@@ -3660,7 +3332,7 @@
           <p:cNvPr id="4" name="Cubo 3">
             <a:extLst>
               <a:ext uri="{FF2B5EF4-FFF2-40B4-BE49-F238E27FC236}">
-                <a16:creationId xmlns="" xmlns:a16="http://schemas.microsoft.com/office/drawing/2014/main" id="{98618C7C-3DA4-4764-9834-48BB32FA8E17}"/>
+                <a16:creationId xmlns:a16="http://schemas.microsoft.com/office/drawing/2014/main" xmlns="" id="{98618C7C-3DA4-4764-9834-48BB32FA8E17}"/>
               </a:ext>
             </a:extLst>
           </p:cNvPr>
@@ -3713,10 +3385,6 @@
               </a:rPr>
               <a:t>Balcão de Atendimento</a:t>
             </a:r>
-            <a:endParaRPr lang="pt-BR" sz="1200" dirty="0" smtClean="0">
-              <a:latin typeface="Arial" panose="020B0604020202020204" pitchFamily="34" charset="0"/>
-              <a:cs typeface="Arial" panose="020B0604020202020204" pitchFamily="34" charset="0"/>
-            </a:endParaRPr>
           </a:p>
           <a:p>
             <a:pPr marL="0" marR="0" indent="0" algn="l" defTabSz="914400" rtl="0" eaLnBrk="1" fontAlgn="base" latinLnBrk="0" hangingPunct="1">
@@ -3756,7 +3424,7 @@
           <p:cNvPr id="5" name="Retângulo de cantos arredondados 111">
             <a:extLst>
               <a:ext uri="{FF2B5EF4-FFF2-40B4-BE49-F238E27FC236}">
-                <a16:creationId xmlns="" xmlns:a16="http://schemas.microsoft.com/office/drawing/2014/main" id="{67FC9C97-6BBA-4BFC-A5E1-2436DE02BBE2}"/>
+                <a16:creationId xmlns:a16="http://schemas.microsoft.com/office/drawing/2014/main" xmlns="" id="{67FC9C97-6BBA-4BFC-A5E1-2436DE02BBE2}"/>
               </a:ext>
             </a:extLst>
           </p:cNvPr>
@@ -3837,7 +3505,7 @@
           <p:cNvPr id="6" name="Retângulo 5">
             <a:extLst>
               <a:ext uri="{FF2B5EF4-FFF2-40B4-BE49-F238E27FC236}">
-                <a16:creationId xmlns="" xmlns:a16="http://schemas.microsoft.com/office/drawing/2014/main" id="{60488A81-F715-4F1B-B2A8-84FD4A5E863D}"/>
+                <a16:creationId xmlns:a16="http://schemas.microsoft.com/office/drawing/2014/main" xmlns="" id="{60488A81-F715-4F1B-B2A8-84FD4A5E863D}"/>
               </a:ext>
             </a:extLst>
           </p:cNvPr>
@@ -3889,7 +3557,7 @@
           <p:cNvPr id="7" name="Conector: Curvo 23">
             <a:extLst>
               <a:ext uri="{FF2B5EF4-FFF2-40B4-BE49-F238E27FC236}">
-                <a16:creationId xmlns="" xmlns:a16="http://schemas.microsoft.com/office/drawing/2014/main" id="{44A9E956-499F-4429-8233-C6931F55333B}"/>
+                <a16:creationId xmlns:a16="http://schemas.microsoft.com/office/drawing/2014/main" xmlns="" id="{44A9E956-499F-4429-8233-C6931F55333B}"/>
               </a:ext>
             </a:extLst>
           </p:cNvPr>
@@ -3931,7 +3599,7 @@
           <p:cNvPr id="8" name="Retângulo: Cantos Arredondados 25">
             <a:extLst>
               <a:ext uri="{FF2B5EF4-FFF2-40B4-BE49-F238E27FC236}">
-                <a16:creationId xmlns="" xmlns:a16="http://schemas.microsoft.com/office/drawing/2014/main" id="{0CC10807-6876-4F24-9E71-B543D1F8799A}"/>
+                <a16:creationId xmlns:a16="http://schemas.microsoft.com/office/drawing/2014/main" xmlns="" id="{0CC10807-6876-4F24-9E71-B543D1F8799A}"/>
               </a:ext>
             </a:extLst>
           </p:cNvPr>
@@ -3994,7 +3662,7 @@
           <p:cNvPr id="9" name="Conector reto 8">
             <a:extLst>
               <a:ext uri="{FF2B5EF4-FFF2-40B4-BE49-F238E27FC236}">
-                <a16:creationId xmlns="" xmlns:a16="http://schemas.microsoft.com/office/drawing/2014/main" id="{59DADD7E-FDEE-4062-8BCD-3A38A85A4179}"/>
+                <a16:creationId xmlns:a16="http://schemas.microsoft.com/office/drawing/2014/main" xmlns="" id="{59DADD7E-FDEE-4062-8BCD-3A38A85A4179}"/>
               </a:ext>
             </a:extLst>
           </p:cNvPr>
@@ -4048,7 +3716,7 @@
 </p:sld>
 </file>
 
-<file path=ppt/slides/slide5.xml><?xml version="1.0" encoding="utf-8"?>
+<file path=ppt/slides/slide3.xml><?xml version="1.0" encoding="utf-8"?>
 <p:sld xmlns:a="http://schemas.openxmlformats.org/drawingml/2006/main" xmlns:r="http://schemas.openxmlformats.org/officeDocument/2006/relationships" xmlns:p="http://schemas.openxmlformats.org/presentationml/2006/main">
   <p:cSld>
     <p:spTree>
@@ -4116,7 +3784,7 @@
           <p:cNvPr id="4" name="Cubo 3">
             <a:extLst>
               <a:ext uri="{FF2B5EF4-FFF2-40B4-BE49-F238E27FC236}">
-                <a16:creationId xmlns="" xmlns:a16="http://schemas.microsoft.com/office/drawing/2014/main" id="{98618C7C-3DA4-4764-9834-48BB32FA8E17}"/>
+                <a16:creationId xmlns:a16="http://schemas.microsoft.com/office/drawing/2014/main" xmlns="" id="{98618C7C-3DA4-4764-9834-48BB32FA8E17}"/>
               </a:ext>
             </a:extLst>
           </p:cNvPr>
@@ -4212,7 +3880,7 @@
           <p:cNvPr id="5" name="Retângulo de cantos arredondados 111">
             <a:extLst>
               <a:ext uri="{FF2B5EF4-FFF2-40B4-BE49-F238E27FC236}">
-                <a16:creationId xmlns="" xmlns:a16="http://schemas.microsoft.com/office/drawing/2014/main" id="{67FC9C97-6BBA-4BFC-A5E1-2436DE02BBE2}"/>
+                <a16:creationId xmlns:a16="http://schemas.microsoft.com/office/drawing/2014/main" xmlns="" id="{67FC9C97-6BBA-4BFC-A5E1-2436DE02BBE2}"/>
               </a:ext>
             </a:extLst>
           </p:cNvPr>
@@ -4293,7 +3961,7 @@
           <p:cNvPr id="6" name="Retângulo 5">
             <a:extLst>
               <a:ext uri="{FF2B5EF4-FFF2-40B4-BE49-F238E27FC236}">
-                <a16:creationId xmlns="" xmlns:a16="http://schemas.microsoft.com/office/drawing/2014/main" id="{60488A81-F715-4F1B-B2A8-84FD4A5E863D}"/>
+                <a16:creationId xmlns:a16="http://schemas.microsoft.com/office/drawing/2014/main" xmlns="" id="{60488A81-F715-4F1B-B2A8-84FD4A5E863D}"/>
               </a:ext>
             </a:extLst>
           </p:cNvPr>
@@ -4345,7 +4013,7 @@
           <p:cNvPr id="7" name="Conector: Curvo 23">
             <a:extLst>
               <a:ext uri="{FF2B5EF4-FFF2-40B4-BE49-F238E27FC236}">
-                <a16:creationId xmlns="" xmlns:a16="http://schemas.microsoft.com/office/drawing/2014/main" id="{44A9E956-499F-4429-8233-C6931F55333B}"/>
+                <a16:creationId xmlns:a16="http://schemas.microsoft.com/office/drawing/2014/main" xmlns="" id="{44A9E956-499F-4429-8233-C6931F55333B}"/>
               </a:ext>
             </a:extLst>
           </p:cNvPr>
@@ -4387,7 +4055,7 @@
           <p:cNvPr id="8" name="Retângulo: Cantos Arredondados 25">
             <a:extLst>
               <a:ext uri="{FF2B5EF4-FFF2-40B4-BE49-F238E27FC236}">
-                <a16:creationId xmlns="" xmlns:a16="http://schemas.microsoft.com/office/drawing/2014/main" id="{0CC10807-6876-4F24-9E71-B543D1F8799A}"/>
+                <a16:creationId xmlns:a16="http://schemas.microsoft.com/office/drawing/2014/main" xmlns="" id="{0CC10807-6876-4F24-9E71-B543D1F8799A}"/>
               </a:ext>
             </a:extLst>
           </p:cNvPr>
@@ -4450,7 +4118,7 @@
           <p:cNvPr id="9" name="Conector reto 8">
             <a:extLst>
               <a:ext uri="{FF2B5EF4-FFF2-40B4-BE49-F238E27FC236}">
-                <a16:creationId xmlns="" xmlns:a16="http://schemas.microsoft.com/office/drawing/2014/main" id="{59DADD7E-FDEE-4062-8BCD-3A38A85A4179}"/>
+                <a16:creationId xmlns:a16="http://schemas.microsoft.com/office/drawing/2014/main" xmlns="" id="{59DADD7E-FDEE-4062-8BCD-3A38A85A4179}"/>
               </a:ext>
             </a:extLst>
           </p:cNvPr>
@@ -4504,7 +4172,7 @@
 </p:sld>
 </file>
 
-<file path=ppt/slides/slide6.xml><?xml version="1.0" encoding="utf-8"?>
+<file path=ppt/slides/slide4.xml><?xml version="1.0" encoding="utf-8"?>
 <p:sld xmlns:a="http://schemas.openxmlformats.org/drawingml/2006/main" xmlns:r="http://schemas.openxmlformats.org/officeDocument/2006/relationships" xmlns:p="http://schemas.openxmlformats.org/presentationml/2006/main">
   <p:cSld>
     <p:spTree>
@@ -4568,7 +4236,7 @@
           <p:cNvPr id="10" name="Cubo 9">
             <a:extLst>
               <a:ext uri="{FF2B5EF4-FFF2-40B4-BE49-F238E27FC236}">
-                <a16:creationId xmlns="" xmlns:a16="http://schemas.microsoft.com/office/drawing/2014/main" id="{98618C7C-3DA4-4764-9834-48BB32FA8E17}"/>
+                <a16:creationId xmlns:a16="http://schemas.microsoft.com/office/drawing/2014/main" xmlns="" id="{98618C7C-3DA4-4764-9834-48BB32FA8E17}"/>
               </a:ext>
             </a:extLst>
           </p:cNvPr>
@@ -4664,7 +4332,7 @@
           <p:cNvPr id="11" name="Retângulo de cantos arredondados 111">
             <a:extLst>
               <a:ext uri="{FF2B5EF4-FFF2-40B4-BE49-F238E27FC236}">
-                <a16:creationId xmlns="" xmlns:a16="http://schemas.microsoft.com/office/drawing/2014/main" id="{67FC9C97-6BBA-4BFC-A5E1-2436DE02BBE2}"/>
+                <a16:creationId xmlns:a16="http://schemas.microsoft.com/office/drawing/2014/main" xmlns="" id="{67FC9C97-6BBA-4BFC-A5E1-2436DE02BBE2}"/>
               </a:ext>
             </a:extLst>
           </p:cNvPr>
@@ -4745,7 +4413,7 @@
           <p:cNvPr id="12" name="Retângulo 11">
             <a:extLst>
               <a:ext uri="{FF2B5EF4-FFF2-40B4-BE49-F238E27FC236}">
-                <a16:creationId xmlns="" xmlns:a16="http://schemas.microsoft.com/office/drawing/2014/main" id="{60488A81-F715-4F1B-B2A8-84FD4A5E863D}"/>
+                <a16:creationId xmlns:a16="http://schemas.microsoft.com/office/drawing/2014/main" xmlns="" id="{60488A81-F715-4F1B-B2A8-84FD4A5E863D}"/>
               </a:ext>
             </a:extLst>
           </p:cNvPr>
@@ -4797,7 +4465,7 @@
           <p:cNvPr id="13" name="Conector: Curvo 23">
             <a:extLst>
               <a:ext uri="{FF2B5EF4-FFF2-40B4-BE49-F238E27FC236}">
-                <a16:creationId xmlns="" xmlns:a16="http://schemas.microsoft.com/office/drawing/2014/main" id="{44A9E956-499F-4429-8233-C6931F55333B}"/>
+                <a16:creationId xmlns:a16="http://schemas.microsoft.com/office/drawing/2014/main" xmlns="" id="{44A9E956-499F-4429-8233-C6931F55333B}"/>
               </a:ext>
             </a:extLst>
           </p:cNvPr>
@@ -4839,7 +4507,7 @@
           <p:cNvPr id="14" name="Retângulo: Cantos Arredondados 25">
             <a:extLst>
               <a:ext uri="{FF2B5EF4-FFF2-40B4-BE49-F238E27FC236}">
-                <a16:creationId xmlns="" xmlns:a16="http://schemas.microsoft.com/office/drawing/2014/main" id="{0CC10807-6876-4F24-9E71-B543D1F8799A}"/>
+                <a16:creationId xmlns:a16="http://schemas.microsoft.com/office/drawing/2014/main" xmlns="" id="{0CC10807-6876-4F24-9E71-B543D1F8799A}"/>
               </a:ext>
             </a:extLst>
           </p:cNvPr>
@@ -4902,7 +4570,7 @@
           <p:cNvPr id="15" name="Conector reto 14">
             <a:extLst>
               <a:ext uri="{FF2B5EF4-FFF2-40B4-BE49-F238E27FC236}">
-                <a16:creationId xmlns="" xmlns:a16="http://schemas.microsoft.com/office/drawing/2014/main" id="{59DADD7E-FDEE-4062-8BCD-3A38A85A4179}"/>
+                <a16:creationId xmlns:a16="http://schemas.microsoft.com/office/drawing/2014/main" xmlns="" id="{59DADD7E-FDEE-4062-8BCD-3A38A85A4179}"/>
               </a:ext>
             </a:extLst>
           </p:cNvPr>
@@ -4940,932 +4608,6 @@
     <p:extLst>
       <p:ext uri="{BB962C8B-B14F-4D97-AF65-F5344CB8AC3E}">
         <p14:creationId xmlns:p14="http://schemas.microsoft.com/office/powerpoint/2010/main" val="4202848361"/>
-      </p:ext>
-    </p:extLst>
-  </p:cSld>
-  <p:clrMapOvr>
-    <a:masterClrMapping/>
-  </p:clrMapOvr>
-  <p:timing>
-    <p:tnLst>
-      <p:par>
-        <p:cTn id="1" dur="indefinite" restart="never" nodeType="tmRoot"/>
-      </p:par>
-    </p:tnLst>
-  </p:timing>
-</p:sld>
-</file>
-
-<file path=ppt/slides/slide7.xml><?xml version="1.0" encoding="utf-8"?>
-<p:sld xmlns:a="http://schemas.openxmlformats.org/drawingml/2006/main" xmlns:r="http://schemas.openxmlformats.org/officeDocument/2006/relationships" xmlns:p="http://schemas.openxmlformats.org/presentationml/2006/main">
-  <p:cSld>
-    <p:spTree>
-      <p:nvGrpSpPr>
-        <p:cNvPr id="1" name=""/>
-        <p:cNvGrpSpPr/>
-        <p:nvPr/>
-      </p:nvGrpSpPr>
-      <p:grpSpPr>
-        <a:xfrm>
-          <a:off x="0" y="0"/>
-          <a:ext cx="0" cy="0"/>
-          <a:chOff x="0" y="0"/>
-          <a:chExt cx="0" cy="0"/>
-        </a:xfrm>
-      </p:grpSpPr>
-      <p:sp>
-        <p:nvSpPr>
-          <p:cNvPr id="2" name="Título 1"/>
-          <p:cNvSpPr>
-            <a:spLocks noGrp="1"/>
-          </p:cNvSpPr>
-          <p:nvPr>
-            <p:ph type="title"/>
-          </p:nvPr>
-        </p:nvSpPr>
-        <p:spPr/>
-        <p:txBody>
-          <a:bodyPr/>
-          <a:lstStyle/>
-          <a:p>
-            <a:r>
-              <a:rPr lang="pt-BR" dirty="0" smtClean="0"/>
-              <a:t>Resumo</a:t>
-            </a:r>
-            <a:endParaRPr lang="pt-BR" dirty="0"/>
-          </a:p>
-        </p:txBody>
-      </p:sp>
-      <p:sp>
-        <p:nvSpPr>
-          <p:cNvPr id="5" name="Espaço Reservado para Texto 3">
-            <a:extLst>
-              <a:ext uri="{FF2B5EF4-FFF2-40B4-BE49-F238E27FC236}">
-                <a16:creationId xmlns="" xmlns:a16="http://schemas.microsoft.com/office/drawing/2014/main" id="{F9FF181B-2D9F-4502-9879-8467C798BC6F}"/>
-              </a:ext>
-            </a:extLst>
-          </p:cNvPr>
-          <p:cNvSpPr txBox="1">
-            <a:spLocks/>
-          </p:cNvSpPr>
-          <p:nvPr/>
-        </p:nvSpPr>
-        <p:spPr>
-          <a:xfrm>
-            <a:off x="839789" y="1681162"/>
-            <a:ext cx="2967714" cy="573401"/>
-          </a:xfrm>
-          <a:prstGeom prst="rect">
-            <a:avLst/>
-          </a:prstGeom>
-        </p:spPr>
-        <p:txBody>
-          <a:bodyPr vert="horz" lIns="91440" tIns="45720" rIns="91440" bIns="45720" rtlCol="0">
-            <a:normAutofit/>
-          </a:bodyPr>
-          <a:lstStyle>
-            <a:lvl1pPr marL="228600" indent="-228600" algn="l" defTabSz="914400" rtl="0" eaLnBrk="1" latinLnBrk="0" hangingPunct="1">
-              <a:lnSpc>
-                <a:spcPct val="90000"/>
-              </a:lnSpc>
-              <a:spcBef>
-                <a:spcPts val="1000"/>
-              </a:spcBef>
-              <a:buFont typeface="Arial" panose="020B0604020202020204" pitchFamily="34" charset="0"/>
-              <a:buChar char="•"/>
-              <a:defRPr sz="2800" kern="1200">
-                <a:solidFill>
-                  <a:schemeClr val="tx1"/>
-                </a:solidFill>
-                <a:latin typeface="+mn-lt"/>
-                <a:ea typeface="+mn-ea"/>
-                <a:cs typeface="+mn-cs"/>
-              </a:defRPr>
-            </a:lvl1pPr>
-            <a:lvl2pPr marL="685800" indent="-228600" algn="l" defTabSz="914400" rtl="0" eaLnBrk="1" latinLnBrk="0" hangingPunct="1">
-              <a:lnSpc>
-                <a:spcPct val="90000"/>
-              </a:lnSpc>
-              <a:spcBef>
-                <a:spcPts val="500"/>
-              </a:spcBef>
-              <a:buFont typeface="Arial" panose="020B0604020202020204" pitchFamily="34" charset="0"/>
-              <a:buChar char="•"/>
-              <a:defRPr sz="2400" kern="1200">
-                <a:solidFill>
-                  <a:schemeClr val="tx1"/>
-                </a:solidFill>
-                <a:latin typeface="+mn-lt"/>
-                <a:ea typeface="+mn-ea"/>
-                <a:cs typeface="+mn-cs"/>
-              </a:defRPr>
-            </a:lvl2pPr>
-            <a:lvl3pPr marL="1143000" indent="-228600" algn="l" defTabSz="914400" rtl="0" eaLnBrk="1" latinLnBrk="0" hangingPunct="1">
-              <a:lnSpc>
-                <a:spcPct val="90000"/>
-              </a:lnSpc>
-              <a:spcBef>
-                <a:spcPts val="500"/>
-              </a:spcBef>
-              <a:buFont typeface="Arial" panose="020B0604020202020204" pitchFamily="34" charset="0"/>
-              <a:buChar char="•"/>
-              <a:defRPr sz="2000" kern="1200">
-                <a:solidFill>
-                  <a:schemeClr val="tx1"/>
-                </a:solidFill>
-                <a:latin typeface="+mn-lt"/>
-                <a:ea typeface="+mn-ea"/>
-                <a:cs typeface="+mn-cs"/>
-              </a:defRPr>
-            </a:lvl3pPr>
-            <a:lvl4pPr marL="1600200" indent="-228600" algn="l" defTabSz="914400" rtl="0" eaLnBrk="1" latinLnBrk="0" hangingPunct="1">
-              <a:lnSpc>
-                <a:spcPct val="90000"/>
-              </a:lnSpc>
-              <a:spcBef>
-                <a:spcPts val="500"/>
-              </a:spcBef>
-              <a:buFont typeface="Arial" panose="020B0604020202020204" pitchFamily="34" charset="0"/>
-              <a:buChar char="•"/>
-              <a:defRPr sz="1800" kern="1200">
-                <a:solidFill>
-                  <a:schemeClr val="tx1"/>
-                </a:solidFill>
-                <a:latin typeface="+mn-lt"/>
-                <a:ea typeface="+mn-ea"/>
-                <a:cs typeface="+mn-cs"/>
-              </a:defRPr>
-            </a:lvl4pPr>
-            <a:lvl5pPr marL="2057400" indent="-228600" algn="l" defTabSz="914400" rtl="0" eaLnBrk="1" latinLnBrk="0" hangingPunct="1">
-              <a:lnSpc>
-                <a:spcPct val="90000"/>
-              </a:lnSpc>
-              <a:spcBef>
-                <a:spcPts val="500"/>
-              </a:spcBef>
-              <a:buFont typeface="Arial" panose="020B0604020202020204" pitchFamily="34" charset="0"/>
-              <a:buChar char="•"/>
-              <a:defRPr sz="1800" kern="1200">
-                <a:solidFill>
-                  <a:schemeClr val="tx1"/>
-                </a:solidFill>
-                <a:latin typeface="+mn-lt"/>
-                <a:ea typeface="+mn-ea"/>
-                <a:cs typeface="+mn-cs"/>
-              </a:defRPr>
-            </a:lvl5pPr>
-            <a:lvl6pPr marL="2514600" indent="-228600" algn="l" defTabSz="914400" rtl="0" eaLnBrk="1" latinLnBrk="0" hangingPunct="1">
-              <a:lnSpc>
-                <a:spcPct val="90000"/>
-              </a:lnSpc>
-              <a:spcBef>
-                <a:spcPts val="500"/>
-              </a:spcBef>
-              <a:buFont typeface="Arial" panose="020B0604020202020204" pitchFamily="34" charset="0"/>
-              <a:buChar char="•"/>
-              <a:defRPr sz="1800" kern="1200">
-                <a:solidFill>
-                  <a:schemeClr val="tx1"/>
-                </a:solidFill>
-                <a:latin typeface="+mn-lt"/>
-                <a:ea typeface="+mn-ea"/>
-                <a:cs typeface="+mn-cs"/>
-              </a:defRPr>
-            </a:lvl6pPr>
-            <a:lvl7pPr marL="2971800" indent="-228600" algn="l" defTabSz="914400" rtl="0" eaLnBrk="1" latinLnBrk="0" hangingPunct="1">
-              <a:lnSpc>
-                <a:spcPct val="90000"/>
-              </a:lnSpc>
-              <a:spcBef>
-                <a:spcPts val="500"/>
-              </a:spcBef>
-              <a:buFont typeface="Arial" panose="020B0604020202020204" pitchFamily="34" charset="0"/>
-              <a:buChar char="•"/>
-              <a:defRPr sz="1800" kern="1200">
-                <a:solidFill>
-                  <a:schemeClr val="tx1"/>
-                </a:solidFill>
-                <a:latin typeface="+mn-lt"/>
-                <a:ea typeface="+mn-ea"/>
-                <a:cs typeface="+mn-cs"/>
-              </a:defRPr>
-            </a:lvl7pPr>
-            <a:lvl8pPr marL="3429000" indent="-228600" algn="l" defTabSz="914400" rtl="0" eaLnBrk="1" latinLnBrk="0" hangingPunct="1">
-              <a:lnSpc>
-                <a:spcPct val="90000"/>
-              </a:lnSpc>
-              <a:spcBef>
-                <a:spcPts val="500"/>
-              </a:spcBef>
-              <a:buFont typeface="Arial" panose="020B0604020202020204" pitchFamily="34" charset="0"/>
-              <a:buChar char="•"/>
-              <a:defRPr sz="1800" kern="1200">
-                <a:solidFill>
-                  <a:schemeClr val="tx1"/>
-                </a:solidFill>
-                <a:latin typeface="+mn-lt"/>
-                <a:ea typeface="+mn-ea"/>
-                <a:cs typeface="+mn-cs"/>
-              </a:defRPr>
-            </a:lvl8pPr>
-            <a:lvl9pPr marL="3886200" indent="-228600" algn="l" defTabSz="914400" rtl="0" eaLnBrk="1" latinLnBrk="0" hangingPunct="1">
-              <a:lnSpc>
-                <a:spcPct val="90000"/>
-              </a:lnSpc>
-              <a:spcBef>
-                <a:spcPts val="500"/>
-              </a:spcBef>
-              <a:buFont typeface="Arial" panose="020B0604020202020204" pitchFamily="34" charset="0"/>
-              <a:buChar char="•"/>
-              <a:defRPr sz="1800" kern="1200">
-                <a:solidFill>
-                  <a:schemeClr val="tx1"/>
-                </a:solidFill>
-                <a:latin typeface="+mn-lt"/>
-                <a:ea typeface="+mn-ea"/>
-                <a:cs typeface="+mn-cs"/>
-              </a:defRPr>
-            </a:lvl9pPr>
-          </a:lstStyle>
-          <a:p>
-            <a:pPr marL="0" indent="0">
-              <a:buNone/>
-            </a:pPr>
-            <a:r>
-              <a:rPr lang="pt-BR" sz="2000" b="1" dirty="0" smtClean="0">
-                <a:latin typeface="+mj-lt"/>
-              </a:rPr>
-              <a:t>Cenário: Comprar Produto</a:t>
-            </a:r>
-            <a:endParaRPr lang="pt-BR" sz="2000" b="1" dirty="0">
-              <a:latin typeface="+mj-lt"/>
-            </a:endParaRPr>
-          </a:p>
-        </p:txBody>
-      </p:sp>
-      <p:sp>
-        <p:nvSpPr>
-          <p:cNvPr id="6" name="Espaço Reservado para Conteúdo 2">
-            <a:extLst>
-              <a:ext uri="{FF2B5EF4-FFF2-40B4-BE49-F238E27FC236}">
-                <a16:creationId xmlns="" xmlns:a16="http://schemas.microsoft.com/office/drawing/2014/main" id="{EF0A20DC-8164-4611-979E-EE0E40C70C7D}"/>
-              </a:ext>
-            </a:extLst>
-          </p:cNvPr>
-          <p:cNvSpPr>
-            <a:spLocks noGrp="1"/>
-          </p:cNvSpPr>
-          <p:nvPr>
-            <p:ph sz="half" idx="4294967295"/>
-          </p:nvPr>
-        </p:nvSpPr>
-        <p:spPr>
-          <a:xfrm>
-            <a:off x="838199" y="2454691"/>
-            <a:ext cx="3616377" cy="2567014"/>
-          </a:xfrm>
-          <a:prstGeom prst="rect">
-            <a:avLst/>
-          </a:prstGeom>
-        </p:spPr>
-        <p:txBody>
-          <a:bodyPr>
-            <a:normAutofit/>
-          </a:bodyPr>
-          <a:lstStyle/>
-          <a:p>
-            <a:endParaRPr lang="pt-BR" b="1" dirty="0"/>
-          </a:p>
-          <a:p>
-            <a:r>
-              <a:rPr lang="pt-BR" sz="2000" dirty="0" smtClean="0"/>
-              <a:t>Nó Operacional: </a:t>
-            </a:r>
-            <a:r>
-              <a:rPr lang="pt-BR" sz="2000" b="1" dirty="0">
-                <a:cs typeface="Arial" panose="020B0604020202020204" pitchFamily="34" charset="0"/>
-              </a:rPr>
-              <a:t>Balcão de </a:t>
-            </a:r>
-            <a:r>
-              <a:rPr lang="pt-BR" sz="2000" b="1" dirty="0" smtClean="0">
-                <a:cs typeface="Arial" panose="020B0604020202020204" pitchFamily="34" charset="0"/>
-              </a:rPr>
-              <a:t>Atendimento</a:t>
-            </a:r>
-            <a:endParaRPr lang="pt-BR" sz="2000" b="1" dirty="0" smtClean="0"/>
-          </a:p>
-          <a:p>
-            <a:r>
-              <a:rPr lang="pt-BR" sz="2000" dirty="0" smtClean="0"/>
-              <a:t>Capacidade do </a:t>
-            </a:r>
-            <a:r>
-              <a:rPr lang="pt-BR" sz="2000" dirty="0">
-                <a:cs typeface="Arial" panose="020B0604020202020204" pitchFamily="34" charset="0"/>
-              </a:rPr>
-              <a:t>Balcão de </a:t>
-            </a:r>
-            <a:r>
-              <a:rPr lang="pt-BR" sz="2000" dirty="0" smtClean="0">
-                <a:cs typeface="Arial" panose="020B0604020202020204" pitchFamily="34" charset="0"/>
-              </a:rPr>
-              <a:t>Atendimento</a:t>
-            </a:r>
-            <a:r>
-              <a:rPr lang="pt-BR" sz="2000" dirty="0" smtClean="0"/>
-              <a:t>:</a:t>
-            </a:r>
-            <a:endParaRPr lang="pt-BR" sz="2000" dirty="0"/>
-          </a:p>
-          <a:p>
-            <a:pPr lvl="1"/>
-            <a:r>
-              <a:rPr lang="pt-BR" sz="2000" b="1" dirty="0"/>
-              <a:t>Tratar </a:t>
-            </a:r>
-            <a:r>
-              <a:rPr lang="pt-BR" sz="2000" b="1" dirty="0" smtClean="0"/>
-              <a:t>a compra do Produto</a:t>
-            </a:r>
-            <a:endParaRPr lang="pt-BR" sz="2000" dirty="0"/>
-          </a:p>
-        </p:txBody>
-      </p:sp>
-      <p:sp>
-        <p:nvSpPr>
-          <p:cNvPr id="7" name="Espaço Reservado para Texto 4">
-            <a:extLst>
-              <a:ext uri="{FF2B5EF4-FFF2-40B4-BE49-F238E27FC236}">
-                <a16:creationId xmlns="" xmlns:a16="http://schemas.microsoft.com/office/drawing/2014/main" id="{66BF7BCF-F749-4F61-A2C6-65E2432AC048}"/>
-              </a:ext>
-            </a:extLst>
-          </p:cNvPr>
-          <p:cNvSpPr txBox="1">
-            <a:spLocks/>
-          </p:cNvSpPr>
-          <p:nvPr/>
-        </p:nvSpPr>
-        <p:spPr>
-          <a:xfrm>
-            <a:off x="7702188" y="1690688"/>
-            <a:ext cx="3180672" cy="563875"/>
-          </a:xfrm>
-          <a:prstGeom prst="rect">
-            <a:avLst/>
-          </a:prstGeom>
-        </p:spPr>
-        <p:txBody>
-          <a:bodyPr/>
-          <a:lstStyle>
-            <a:lvl1pPr marL="228600" indent="-228600" algn="l" defTabSz="914400" rtl="0" eaLnBrk="1" latinLnBrk="0" hangingPunct="1">
-              <a:lnSpc>
-                <a:spcPct val="90000"/>
-              </a:lnSpc>
-              <a:spcBef>
-                <a:spcPts val="1000"/>
-              </a:spcBef>
-              <a:buFont typeface="Arial" panose="020B0604020202020204" pitchFamily="34" charset="0"/>
-              <a:buChar char="•"/>
-              <a:defRPr sz="2800" kern="1200">
-                <a:solidFill>
-                  <a:schemeClr val="tx1"/>
-                </a:solidFill>
-                <a:latin typeface="+mn-lt"/>
-                <a:ea typeface="+mn-ea"/>
-                <a:cs typeface="+mn-cs"/>
-              </a:defRPr>
-            </a:lvl1pPr>
-            <a:lvl2pPr marL="685800" indent="-228600" algn="l" defTabSz="914400" rtl="0" eaLnBrk="1" latinLnBrk="0" hangingPunct="1">
-              <a:lnSpc>
-                <a:spcPct val="90000"/>
-              </a:lnSpc>
-              <a:spcBef>
-                <a:spcPts val="500"/>
-              </a:spcBef>
-              <a:buFont typeface="Arial" panose="020B0604020202020204" pitchFamily="34" charset="0"/>
-              <a:buChar char="•"/>
-              <a:defRPr sz="2400" kern="1200">
-                <a:solidFill>
-                  <a:schemeClr val="tx1"/>
-                </a:solidFill>
-                <a:latin typeface="+mn-lt"/>
-                <a:ea typeface="+mn-ea"/>
-                <a:cs typeface="+mn-cs"/>
-              </a:defRPr>
-            </a:lvl2pPr>
-            <a:lvl3pPr marL="1143000" indent="-228600" algn="l" defTabSz="914400" rtl="0" eaLnBrk="1" latinLnBrk="0" hangingPunct="1">
-              <a:lnSpc>
-                <a:spcPct val="90000"/>
-              </a:lnSpc>
-              <a:spcBef>
-                <a:spcPts val="500"/>
-              </a:spcBef>
-              <a:buFont typeface="Arial" panose="020B0604020202020204" pitchFamily="34" charset="0"/>
-              <a:buChar char="•"/>
-              <a:defRPr sz="2000" kern="1200">
-                <a:solidFill>
-                  <a:schemeClr val="tx1"/>
-                </a:solidFill>
-                <a:latin typeface="+mn-lt"/>
-                <a:ea typeface="+mn-ea"/>
-                <a:cs typeface="+mn-cs"/>
-              </a:defRPr>
-            </a:lvl3pPr>
-            <a:lvl4pPr marL="1600200" indent="-228600" algn="l" defTabSz="914400" rtl="0" eaLnBrk="1" latinLnBrk="0" hangingPunct="1">
-              <a:lnSpc>
-                <a:spcPct val="90000"/>
-              </a:lnSpc>
-              <a:spcBef>
-                <a:spcPts val="500"/>
-              </a:spcBef>
-              <a:buFont typeface="Arial" panose="020B0604020202020204" pitchFamily="34" charset="0"/>
-              <a:buChar char="•"/>
-              <a:defRPr sz="1800" kern="1200">
-                <a:solidFill>
-                  <a:schemeClr val="tx1"/>
-                </a:solidFill>
-                <a:latin typeface="+mn-lt"/>
-                <a:ea typeface="+mn-ea"/>
-                <a:cs typeface="+mn-cs"/>
-              </a:defRPr>
-            </a:lvl4pPr>
-            <a:lvl5pPr marL="2057400" indent="-228600" algn="l" defTabSz="914400" rtl="0" eaLnBrk="1" latinLnBrk="0" hangingPunct="1">
-              <a:lnSpc>
-                <a:spcPct val="90000"/>
-              </a:lnSpc>
-              <a:spcBef>
-                <a:spcPts val="500"/>
-              </a:spcBef>
-              <a:buFont typeface="Arial" panose="020B0604020202020204" pitchFamily="34" charset="0"/>
-              <a:buChar char="•"/>
-              <a:defRPr sz="1800" kern="1200">
-                <a:solidFill>
-                  <a:schemeClr val="tx1"/>
-                </a:solidFill>
-                <a:latin typeface="+mn-lt"/>
-                <a:ea typeface="+mn-ea"/>
-                <a:cs typeface="+mn-cs"/>
-              </a:defRPr>
-            </a:lvl5pPr>
-            <a:lvl6pPr marL="2514600" indent="-228600" algn="l" defTabSz="914400" rtl="0" eaLnBrk="1" latinLnBrk="0" hangingPunct="1">
-              <a:lnSpc>
-                <a:spcPct val="90000"/>
-              </a:lnSpc>
-              <a:spcBef>
-                <a:spcPts val="500"/>
-              </a:spcBef>
-              <a:buFont typeface="Arial" panose="020B0604020202020204" pitchFamily="34" charset="0"/>
-              <a:buChar char="•"/>
-              <a:defRPr sz="1800" kern="1200">
-                <a:solidFill>
-                  <a:schemeClr val="tx1"/>
-                </a:solidFill>
-                <a:latin typeface="+mn-lt"/>
-                <a:ea typeface="+mn-ea"/>
-                <a:cs typeface="+mn-cs"/>
-              </a:defRPr>
-            </a:lvl6pPr>
-            <a:lvl7pPr marL="2971800" indent="-228600" algn="l" defTabSz="914400" rtl="0" eaLnBrk="1" latinLnBrk="0" hangingPunct="1">
-              <a:lnSpc>
-                <a:spcPct val="90000"/>
-              </a:lnSpc>
-              <a:spcBef>
-                <a:spcPts val="500"/>
-              </a:spcBef>
-              <a:buFont typeface="Arial" panose="020B0604020202020204" pitchFamily="34" charset="0"/>
-              <a:buChar char="•"/>
-              <a:defRPr sz="1800" kern="1200">
-                <a:solidFill>
-                  <a:schemeClr val="tx1"/>
-                </a:solidFill>
-                <a:latin typeface="+mn-lt"/>
-                <a:ea typeface="+mn-ea"/>
-                <a:cs typeface="+mn-cs"/>
-              </a:defRPr>
-            </a:lvl7pPr>
-            <a:lvl8pPr marL="3429000" indent="-228600" algn="l" defTabSz="914400" rtl="0" eaLnBrk="1" latinLnBrk="0" hangingPunct="1">
-              <a:lnSpc>
-                <a:spcPct val="90000"/>
-              </a:lnSpc>
-              <a:spcBef>
-                <a:spcPts val="500"/>
-              </a:spcBef>
-              <a:buFont typeface="Arial" panose="020B0604020202020204" pitchFamily="34" charset="0"/>
-              <a:buChar char="•"/>
-              <a:defRPr sz="1800" kern="1200">
-                <a:solidFill>
-                  <a:schemeClr val="tx1"/>
-                </a:solidFill>
-                <a:latin typeface="+mn-lt"/>
-                <a:ea typeface="+mn-ea"/>
-                <a:cs typeface="+mn-cs"/>
-              </a:defRPr>
-            </a:lvl8pPr>
-            <a:lvl9pPr marL="3886200" indent="-228600" algn="l" defTabSz="914400" rtl="0" eaLnBrk="1" latinLnBrk="0" hangingPunct="1">
-              <a:lnSpc>
-                <a:spcPct val="90000"/>
-              </a:lnSpc>
-              <a:spcBef>
-                <a:spcPts val="500"/>
-              </a:spcBef>
-              <a:buFont typeface="Arial" panose="020B0604020202020204" pitchFamily="34" charset="0"/>
-              <a:buChar char="•"/>
-              <a:defRPr sz="1800" kern="1200">
-                <a:solidFill>
-                  <a:schemeClr val="tx1"/>
-                </a:solidFill>
-                <a:latin typeface="+mn-lt"/>
-                <a:ea typeface="+mn-ea"/>
-                <a:cs typeface="+mn-cs"/>
-              </a:defRPr>
-            </a:lvl9pPr>
-          </a:lstStyle>
-          <a:p>
-            <a:pPr marL="0" indent="0">
-              <a:buNone/>
-            </a:pPr>
-            <a:r>
-              <a:rPr lang="pt-BR" sz="2000" b="1" dirty="0" smtClean="0">
-                <a:latin typeface="+mj-lt"/>
-              </a:rPr>
-              <a:t>Cenário: Retirar Produto</a:t>
-            </a:r>
-            <a:endParaRPr lang="pt-BR" sz="2000" b="1" dirty="0">
-              <a:latin typeface="+mj-lt"/>
-            </a:endParaRPr>
-          </a:p>
-        </p:txBody>
-      </p:sp>
-      <p:sp>
-        <p:nvSpPr>
-          <p:cNvPr id="8" name="Espaço Reservado para Texto 4">
-            <a:extLst>
-              <a:ext uri="{FF2B5EF4-FFF2-40B4-BE49-F238E27FC236}">
-                <a16:creationId xmlns="" xmlns:a16="http://schemas.microsoft.com/office/drawing/2014/main" id="{66BF7BCF-F749-4F61-A2C6-65E2432AC048}"/>
-              </a:ext>
-            </a:extLst>
-          </p:cNvPr>
-          <p:cNvSpPr txBox="1">
-            <a:spLocks/>
-          </p:cNvSpPr>
-          <p:nvPr/>
-        </p:nvSpPr>
-        <p:spPr>
-          <a:xfrm>
-            <a:off x="4407108" y="1692952"/>
-            <a:ext cx="3295079" cy="573401"/>
-          </a:xfrm>
-          <a:prstGeom prst="rect">
-            <a:avLst/>
-          </a:prstGeom>
-        </p:spPr>
-        <p:txBody>
-          <a:bodyPr/>
-          <a:lstStyle>
-            <a:lvl1pPr marL="228600" indent="-228600" algn="l" defTabSz="914400" rtl="0" eaLnBrk="1" latinLnBrk="0" hangingPunct="1">
-              <a:lnSpc>
-                <a:spcPct val="90000"/>
-              </a:lnSpc>
-              <a:spcBef>
-                <a:spcPts val="1000"/>
-              </a:spcBef>
-              <a:buFont typeface="Arial" panose="020B0604020202020204" pitchFamily="34" charset="0"/>
-              <a:buChar char="•"/>
-              <a:defRPr sz="2800" kern="1200">
-                <a:solidFill>
-                  <a:schemeClr val="tx1"/>
-                </a:solidFill>
-                <a:latin typeface="+mn-lt"/>
-                <a:ea typeface="+mn-ea"/>
-                <a:cs typeface="+mn-cs"/>
-              </a:defRPr>
-            </a:lvl1pPr>
-            <a:lvl2pPr marL="685800" indent="-228600" algn="l" defTabSz="914400" rtl="0" eaLnBrk="1" latinLnBrk="0" hangingPunct="1">
-              <a:lnSpc>
-                <a:spcPct val="90000"/>
-              </a:lnSpc>
-              <a:spcBef>
-                <a:spcPts val="500"/>
-              </a:spcBef>
-              <a:buFont typeface="Arial" panose="020B0604020202020204" pitchFamily="34" charset="0"/>
-              <a:buChar char="•"/>
-              <a:defRPr sz="2400" kern="1200">
-                <a:solidFill>
-                  <a:schemeClr val="tx1"/>
-                </a:solidFill>
-                <a:latin typeface="+mn-lt"/>
-                <a:ea typeface="+mn-ea"/>
-                <a:cs typeface="+mn-cs"/>
-              </a:defRPr>
-            </a:lvl2pPr>
-            <a:lvl3pPr marL="1143000" indent="-228600" algn="l" defTabSz="914400" rtl="0" eaLnBrk="1" latinLnBrk="0" hangingPunct="1">
-              <a:lnSpc>
-                <a:spcPct val="90000"/>
-              </a:lnSpc>
-              <a:spcBef>
-                <a:spcPts val="500"/>
-              </a:spcBef>
-              <a:buFont typeface="Arial" panose="020B0604020202020204" pitchFamily="34" charset="0"/>
-              <a:buChar char="•"/>
-              <a:defRPr sz="2000" kern="1200">
-                <a:solidFill>
-                  <a:schemeClr val="tx1"/>
-                </a:solidFill>
-                <a:latin typeface="+mn-lt"/>
-                <a:ea typeface="+mn-ea"/>
-                <a:cs typeface="+mn-cs"/>
-              </a:defRPr>
-            </a:lvl3pPr>
-            <a:lvl4pPr marL="1600200" indent="-228600" algn="l" defTabSz="914400" rtl="0" eaLnBrk="1" latinLnBrk="0" hangingPunct="1">
-              <a:lnSpc>
-                <a:spcPct val="90000"/>
-              </a:lnSpc>
-              <a:spcBef>
-                <a:spcPts val="500"/>
-              </a:spcBef>
-              <a:buFont typeface="Arial" panose="020B0604020202020204" pitchFamily="34" charset="0"/>
-              <a:buChar char="•"/>
-              <a:defRPr sz="1800" kern="1200">
-                <a:solidFill>
-                  <a:schemeClr val="tx1"/>
-                </a:solidFill>
-                <a:latin typeface="+mn-lt"/>
-                <a:ea typeface="+mn-ea"/>
-                <a:cs typeface="+mn-cs"/>
-              </a:defRPr>
-            </a:lvl4pPr>
-            <a:lvl5pPr marL="2057400" indent="-228600" algn="l" defTabSz="914400" rtl="0" eaLnBrk="1" latinLnBrk="0" hangingPunct="1">
-              <a:lnSpc>
-                <a:spcPct val="90000"/>
-              </a:lnSpc>
-              <a:spcBef>
-                <a:spcPts val="500"/>
-              </a:spcBef>
-              <a:buFont typeface="Arial" panose="020B0604020202020204" pitchFamily="34" charset="0"/>
-              <a:buChar char="•"/>
-              <a:defRPr sz="1800" kern="1200">
-                <a:solidFill>
-                  <a:schemeClr val="tx1"/>
-                </a:solidFill>
-                <a:latin typeface="+mn-lt"/>
-                <a:ea typeface="+mn-ea"/>
-                <a:cs typeface="+mn-cs"/>
-              </a:defRPr>
-            </a:lvl5pPr>
-            <a:lvl6pPr marL="2514600" indent="-228600" algn="l" defTabSz="914400" rtl="0" eaLnBrk="1" latinLnBrk="0" hangingPunct="1">
-              <a:lnSpc>
-                <a:spcPct val="90000"/>
-              </a:lnSpc>
-              <a:spcBef>
-                <a:spcPts val="500"/>
-              </a:spcBef>
-              <a:buFont typeface="Arial" panose="020B0604020202020204" pitchFamily="34" charset="0"/>
-              <a:buChar char="•"/>
-              <a:defRPr sz="1800" kern="1200">
-                <a:solidFill>
-                  <a:schemeClr val="tx1"/>
-                </a:solidFill>
-                <a:latin typeface="+mn-lt"/>
-                <a:ea typeface="+mn-ea"/>
-                <a:cs typeface="+mn-cs"/>
-              </a:defRPr>
-            </a:lvl6pPr>
-            <a:lvl7pPr marL="2971800" indent="-228600" algn="l" defTabSz="914400" rtl="0" eaLnBrk="1" latinLnBrk="0" hangingPunct="1">
-              <a:lnSpc>
-                <a:spcPct val="90000"/>
-              </a:lnSpc>
-              <a:spcBef>
-                <a:spcPts val="500"/>
-              </a:spcBef>
-              <a:buFont typeface="Arial" panose="020B0604020202020204" pitchFamily="34" charset="0"/>
-              <a:buChar char="•"/>
-              <a:defRPr sz="1800" kern="1200">
-                <a:solidFill>
-                  <a:schemeClr val="tx1"/>
-                </a:solidFill>
-                <a:latin typeface="+mn-lt"/>
-                <a:ea typeface="+mn-ea"/>
-                <a:cs typeface="+mn-cs"/>
-              </a:defRPr>
-            </a:lvl7pPr>
-            <a:lvl8pPr marL="3429000" indent="-228600" algn="l" defTabSz="914400" rtl="0" eaLnBrk="1" latinLnBrk="0" hangingPunct="1">
-              <a:lnSpc>
-                <a:spcPct val="90000"/>
-              </a:lnSpc>
-              <a:spcBef>
-                <a:spcPts val="500"/>
-              </a:spcBef>
-              <a:buFont typeface="Arial" panose="020B0604020202020204" pitchFamily="34" charset="0"/>
-              <a:buChar char="•"/>
-              <a:defRPr sz="1800" kern="1200">
-                <a:solidFill>
-                  <a:schemeClr val="tx1"/>
-                </a:solidFill>
-                <a:latin typeface="+mn-lt"/>
-                <a:ea typeface="+mn-ea"/>
-                <a:cs typeface="+mn-cs"/>
-              </a:defRPr>
-            </a:lvl8pPr>
-            <a:lvl9pPr marL="3886200" indent="-228600" algn="l" defTabSz="914400" rtl="0" eaLnBrk="1" latinLnBrk="0" hangingPunct="1">
-              <a:lnSpc>
-                <a:spcPct val="90000"/>
-              </a:lnSpc>
-              <a:spcBef>
-                <a:spcPts val="500"/>
-              </a:spcBef>
-              <a:buFont typeface="Arial" panose="020B0604020202020204" pitchFamily="34" charset="0"/>
-              <a:buChar char="•"/>
-              <a:defRPr sz="1800" kern="1200">
-                <a:solidFill>
-                  <a:schemeClr val="tx1"/>
-                </a:solidFill>
-                <a:latin typeface="+mn-lt"/>
-                <a:ea typeface="+mn-ea"/>
-                <a:cs typeface="+mn-cs"/>
-              </a:defRPr>
-            </a:lvl9pPr>
-          </a:lstStyle>
-          <a:p>
-            <a:pPr marL="0" indent="0">
-              <a:buNone/>
-            </a:pPr>
-            <a:r>
-              <a:rPr lang="pt-BR" sz="2000" b="1" dirty="0" smtClean="0">
-                <a:latin typeface="+mj-lt"/>
-              </a:rPr>
-              <a:t>Cenário: Trocar Produto</a:t>
-            </a:r>
-            <a:endParaRPr lang="pt-BR" sz="2000" b="1" dirty="0">
-              <a:latin typeface="+mj-lt"/>
-            </a:endParaRPr>
-          </a:p>
-        </p:txBody>
-      </p:sp>
-      <p:sp>
-        <p:nvSpPr>
-          <p:cNvPr id="9" name="Espaço Reservado para Conteúdo 2">
-            <a:extLst>
-              <a:ext uri="{FF2B5EF4-FFF2-40B4-BE49-F238E27FC236}">
-                <a16:creationId xmlns="" xmlns:a16="http://schemas.microsoft.com/office/drawing/2014/main" id="{EF0A20DC-8164-4611-979E-EE0E40C70C7D}"/>
-              </a:ext>
-            </a:extLst>
-          </p:cNvPr>
-          <p:cNvSpPr>
-            <a:spLocks noGrp="1"/>
-          </p:cNvSpPr>
-          <p:nvPr>
-            <p:ph sz="half" idx="4294967295"/>
-          </p:nvPr>
-        </p:nvSpPr>
-        <p:spPr>
-          <a:xfrm>
-            <a:off x="4454577" y="2454691"/>
-            <a:ext cx="3568908" cy="2567014"/>
-          </a:xfrm>
-          <a:prstGeom prst="rect">
-            <a:avLst/>
-          </a:prstGeom>
-        </p:spPr>
-        <p:txBody>
-          <a:bodyPr/>
-          <a:lstStyle/>
-          <a:p>
-            <a:endParaRPr lang="pt-BR" b="1" dirty="0"/>
-          </a:p>
-          <a:p>
-            <a:r>
-              <a:rPr lang="pt-BR" sz="2000" dirty="0"/>
-              <a:t>Nó Operacional: </a:t>
-            </a:r>
-            <a:r>
-              <a:rPr lang="pt-BR" sz="2000" b="1" dirty="0">
-                <a:cs typeface="Arial" panose="020B0604020202020204" pitchFamily="34" charset="0"/>
-              </a:rPr>
-              <a:t>Balcão de Atendimento</a:t>
-            </a:r>
-            <a:endParaRPr lang="pt-BR" sz="2000" b="1" dirty="0"/>
-          </a:p>
-          <a:p>
-            <a:r>
-              <a:rPr lang="pt-BR" sz="2000" dirty="0"/>
-              <a:t>Capacidade </a:t>
-            </a:r>
-            <a:r>
-              <a:rPr lang="pt-BR" sz="2000" dirty="0" smtClean="0"/>
-              <a:t>do </a:t>
-            </a:r>
-            <a:r>
-              <a:rPr lang="pt-BR" sz="2000" dirty="0">
-                <a:cs typeface="Arial" panose="020B0604020202020204" pitchFamily="34" charset="0"/>
-              </a:rPr>
-              <a:t>Balcão de Atendimento</a:t>
-            </a:r>
-            <a:r>
-              <a:rPr lang="pt-BR" sz="2000" dirty="0"/>
-              <a:t>:</a:t>
-            </a:r>
-            <a:endParaRPr lang="pt-BR" sz="2000" dirty="0"/>
-          </a:p>
-          <a:p>
-            <a:pPr lvl="1"/>
-            <a:r>
-              <a:rPr lang="pt-BR" sz="2000" b="1" dirty="0"/>
-              <a:t>Tratar </a:t>
-            </a:r>
-            <a:r>
-              <a:rPr lang="pt-BR" sz="2000" b="1" dirty="0" smtClean="0"/>
-              <a:t>a Troca do Produto</a:t>
-            </a:r>
-            <a:endParaRPr lang="pt-BR" sz="2000" dirty="0"/>
-          </a:p>
-        </p:txBody>
-      </p:sp>
-      <p:sp>
-        <p:nvSpPr>
-          <p:cNvPr id="10" name="Espaço Reservado para Conteúdo 2">
-            <a:extLst>
-              <a:ext uri="{FF2B5EF4-FFF2-40B4-BE49-F238E27FC236}">
-                <a16:creationId xmlns="" xmlns:a16="http://schemas.microsoft.com/office/drawing/2014/main" id="{EF0A20DC-8164-4611-979E-EE0E40C70C7D}"/>
-              </a:ext>
-            </a:extLst>
-          </p:cNvPr>
-          <p:cNvSpPr>
-            <a:spLocks noGrp="1"/>
-          </p:cNvSpPr>
-          <p:nvPr>
-            <p:ph sz="half" idx="4294967295"/>
-          </p:nvPr>
-        </p:nvSpPr>
-        <p:spPr>
-          <a:xfrm>
-            <a:off x="8023485" y="2464217"/>
-            <a:ext cx="3568908" cy="2557488"/>
-          </a:xfrm>
-          <a:prstGeom prst="rect">
-            <a:avLst/>
-          </a:prstGeom>
-        </p:spPr>
-        <p:txBody>
-          <a:bodyPr>
-            <a:normAutofit/>
-          </a:bodyPr>
-          <a:lstStyle/>
-          <a:p>
-            <a:endParaRPr lang="pt-BR" b="1" dirty="0"/>
-          </a:p>
-          <a:p>
-            <a:r>
-              <a:rPr lang="pt-BR" sz="2000" dirty="0"/>
-              <a:t>Nó Operacional</a:t>
-            </a:r>
-            <a:r>
-              <a:rPr lang="pt-BR" sz="2000" dirty="0"/>
-              <a:t>: </a:t>
-            </a:r>
-            <a:r>
-              <a:rPr lang="pt-BR" sz="2000" b="1" dirty="0">
-                <a:cs typeface="Arial" panose="020B0604020202020204" pitchFamily="34" charset="0"/>
-              </a:rPr>
-              <a:t>Balcão de Atendimento</a:t>
-            </a:r>
-            <a:endParaRPr lang="pt-BR" sz="2000" b="1" dirty="0"/>
-          </a:p>
-          <a:p>
-            <a:r>
-              <a:rPr lang="pt-BR" sz="2000" dirty="0"/>
-              <a:t>Capacidade </a:t>
-            </a:r>
-            <a:r>
-              <a:rPr lang="pt-BR" sz="2000" dirty="0" smtClean="0"/>
-              <a:t>do </a:t>
-            </a:r>
-            <a:r>
-              <a:rPr lang="pt-BR" sz="2000" dirty="0">
-                <a:cs typeface="Arial" panose="020B0604020202020204" pitchFamily="34" charset="0"/>
-              </a:rPr>
-              <a:t>Balcão de Atendimento</a:t>
-            </a:r>
-            <a:r>
-              <a:rPr lang="pt-BR" sz="2000" dirty="0"/>
-              <a:t>:</a:t>
-            </a:r>
-            <a:endParaRPr lang="pt-BR" sz="2000" dirty="0"/>
-          </a:p>
-          <a:p>
-            <a:pPr lvl="1"/>
-            <a:r>
-              <a:rPr lang="pt-BR" sz="2000" b="1" dirty="0" smtClean="0"/>
-              <a:t>Tratar a Retirada do Produto</a:t>
-            </a:r>
-            <a:endParaRPr lang="pt-BR" sz="2000" dirty="0"/>
-          </a:p>
-        </p:txBody>
-      </p:sp>
-    </p:spTree>
-    <p:extLst>
-      <p:ext uri="{BB962C8B-B14F-4D97-AF65-F5344CB8AC3E}">
-        <p14:creationId xmlns:p14="http://schemas.microsoft.com/office/powerpoint/2010/main" val="2138268159"/>
       </p:ext>
     </p:extLst>
   </p:cSld>

</xml_diff>